<commit_message>
adding r and db to PPT
</commit_message>
<xml_diff>
--- a/SEGMENT 2/Group 10 PowerPoint_Segment_2.pptx
+++ b/SEGMENT 2/Group 10 PowerPoint_Segment_2.pptx
@@ -5,7 +5,7 @@
     <p:sldMasterId id="2147483659" r:id="rId1"/>
   </p:sldMasterIdLst>
   <p:notesMasterIdLst>
-    <p:notesMasterId r:id="rId23"/>
+    <p:notesMasterId r:id="rId26"/>
   </p:notesMasterIdLst>
   <p:sldIdLst>
     <p:sldId id="256" r:id="rId2"/>
@@ -29,29 +29,33 @@
     <p:sldId id="274" r:id="rId20"/>
     <p:sldId id="275" r:id="rId21"/>
     <p:sldId id="276" r:id="rId22"/>
+    <p:sldId id="277" r:id="rId23"/>
+    <p:sldId id="278" r:id="rId24"/>
+    <p:sldId id="279" r:id="rId25"/>
   </p:sldIdLst>
   <p:sldSz cx="9144000" cy="5143500" type="screen16x9"/>
   <p:notesSz cx="6858000" cy="9144000"/>
   <p:embeddedFontLst>
     <p:embeddedFont>
       <p:font typeface="Calibri" panose="020F0502020204030204" pitchFamily="34" charset="0"/>
-      <p:regular r:id="rId24"/>
-      <p:bold r:id="rId25"/>
-      <p:italic r:id="rId26"/>
-      <p:boldItalic r:id="rId27"/>
+      <p:regular r:id="rId27"/>
+      <p:bold r:id="rId28"/>
+      <p:italic r:id="rId29"/>
+      <p:boldItalic r:id="rId30"/>
     </p:embeddedFont>
     <p:embeddedFont>
       <p:font typeface="Georgia" panose="02040502050405020303" pitchFamily="18" charset="0"/>
-      <p:regular r:id="rId28"/>
-      <p:bold r:id="rId29"/>
-      <p:italic r:id="rId30"/>
-    </p:embeddedFont>
-    <p:embeddedFont>
-      <p:font typeface="Roboto" panose="02000000000000000000" pitchFamily="2" charset="0"/>
       <p:regular r:id="rId31"/>
       <p:bold r:id="rId32"/>
       <p:italic r:id="rId33"/>
       <p:boldItalic r:id="rId34"/>
+    </p:embeddedFont>
+    <p:embeddedFont>
+      <p:font typeface="Roboto" panose="02000000000000000000" pitchFamily="2" charset="0"/>
+      <p:regular r:id="rId35"/>
+      <p:bold r:id="rId36"/>
+      <p:italic r:id="rId37"/>
+      <p:boldItalic r:id="rId38"/>
     </p:embeddedFont>
   </p:embeddedFontLst>
   <p:defaultTextStyle>
@@ -2192,6 +2196,333 @@
         </p:txBody>
       </p:sp>
     </p:spTree>
+  </p:cSld>
+  <p:clrMapOvr>
+    <a:masterClrMapping/>
+  </p:clrMapOvr>
+</p:notes>
+</file>
+
+<file path=ppt/notesSlides/notesSlide22.xml><?xml version="1.0" encoding="utf-8"?>
+<p:notes xmlns:a="http://schemas.openxmlformats.org/drawingml/2006/main" xmlns:r="http://schemas.openxmlformats.org/officeDocument/2006/relationships" xmlns:p="http://schemas.openxmlformats.org/presentationml/2006/main" showMasterSp="0" showMasterPhAnim="0">
+  <p:cSld>
+    <p:spTree>
+      <p:nvGrpSpPr>
+        <p:cNvPr id="1" name="Shape 220"/>
+        <p:cNvGrpSpPr/>
+        <p:nvPr/>
+      </p:nvGrpSpPr>
+      <p:grpSpPr>
+        <a:xfrm>
+          <a:off x="0" y="0"/>
+          <a:ext cx="0" cy="0"/>
+          <a:chOff x="0" y="0"/>
+          <a:chExt cx="0" cy="0"/>
+        </a:xfrm>
+      </p:grpSpPr>
+      <p:sp>
+        <p:nvSpPr>
+          <p:cNvPr id="221" name="Google Shape;221;ge478d14cb1_4_0:notes"/>
+          <p:cNvSpPr>
+            <a:spLocks noGrp="1" noRot="1" noChangeAspect="1"/>
+          </p:cNvSpPr>
+          <p:nvPr>
+            <p:ph type="sldImg" idx="2"/>
+          </p:nvPr>
+        </p:nvSpPr>
+        <p:spPr>
+          <a:xfrm>
+            <a:off x="381000" y="685800"/>
+            <a:ext cx="6096000" cy="3429000"/>
+          </a:xfrm>
+          <a:custGeom>
+            <a:avLst/>
+            <a:gdLst/>
+            <a:ahLst/>
+            <a:cxnLst/>
+            <a:rect l="l" t="t" r="r" b="b"/>
+            <a:pathLst>
+              <a:path w="120000" h="120000" extrusionOk="0">
+                <a:moveTo>
+                  <a:pt x="0" y="0"/>
+                </a:moveTo>
+                <a:lnTo>
+                  <a:pt x="120000" y="0"/>
+                </a:lnTo>
+                <a:lnTo>
+                  <a:pt x="120000" y="120000"/>
+                </a:lnTo>
+                <a:lnTo>
+                  <a:pt x="0" y="120000"/>
+                </a:lnTo>
+                <a:close/>
+              </a:path>
+            </a:pathLst>
+          </a:custGeom>
+        </p:spPr>
+      </p:sp>
+      <p:sp>
+        <p:nvSpPr>
+          <p:cNvPr id="222" name="Google Shape;222;ge478d14cb1_4_0:notes"/>
+          <p:cNvSpPr txBox="1">
+            <a:spLocks noGrp="1"/>
+          </p:cNvSpPr>
+          <p:nvPr>
+            <p:ph type="body" idx="1"/>
+          </p:nvPr>
+        </p:nvSpPr>
+        <p:spPr>
+          <a:xfrm>
+            <a:off x="685800" y="4343400"/>
+            <a:ext cx="5486400" cy="4114800"/>
+          </a:xfrm>
+          <a:prstGeom prst="rect">
+            <a:avLst/>
+          </a:prstGeom>
+        </p:spPr>
+        <p:txBody>
+          <a:bodyPr spcFirstLastPara="1" wrap="square" lIns="91425" tIns="91425" rIns="91425" bIns="91425" anchor="t" anchorCtr="0">
+            <a:noAutofit/>
+          </a:bodyPr>
+          <a:lstStyle/>
+          <a:p>
+            <a:pPr marL="0" lvl="0" indent="0" algn="l" rtl="0">
+              <a:spcBef>
+                <a:spcPts val="0"/>
+              </a:spcBef>
+              <a:spcAft>
+                <a:spcPts val="0"/>
+              </a:spcAft>
+              <a:buNone/>
+            </a:pPr>
+            <a:endParaRPr/>
+          </a:p>
+        </p:txBody>
+      </p:sp>
+    </p:spTree>
+    <p:extLst>
+      <p:ext uri="{BB962C8B-B14F-4D97-AF65-F5344CB8AC3E}">
+        <p14:creationId xmlns:p14="http://schemas.microsoft.com/office/powerpoint/2010/main" val="2608979370"/>
+      </p:ext>
+    </p:extLst>
+  </p:cSld>
+  <p:clrMapOvr>
+    <a:masterClrMapping/>
+  </p:clrMapOvr>
+</p:notes>
+</file>
+
+<file path=ppt/notesSlides/notesSlide23.xml><?xml version="1.0" encoding="utf-8"?>
+<p:notes xmlns:a="http://schemas.openxmlformats.org/drawingml/2006/main" xmlns:r="http://schemas.openxmlformats.org/officeDocument/2006/relationships" xmlns:p="http://schemas.openxmlformats.org/presentationml/2006/main" showMasterSp="0" showMasterPhAnim="0">
+  <p:cSld>
+    <p:spTree>
+      <p:nvGrpSpPr>
+        <p:cNvPr id="1" name="Shape 220"/>
+        <p:cNvGrpSpPr/>
+        <p:nvPr/>
+      </p:nvGrpSpPr>
+      <p:grpSpPr>
+        <a:xfrm>
+          <a:off x="0" y="0"/>
+          <a:ext cx="0" cy="0"/>
+          <a:chOff x="0" y="0"/>
+          <a:chExt cx="0" cy="0"/>
+        </a:xfrm>
+      </p:grpSpPr>
+      <p:sp>
+        <p:nvSpPr>
+          <p:cNvPr id="221" name="Google Shape;221;ge478d14cb1_4_0:notes"/>
+          <p:cNvSpPr>
+            <a:spLocks noGrp="1" noRot="1" noChangeAspect="1"/>
+          </p:cNvSpPr>
+          <p:nvPr>
+            <p:ph type="sldImg" idx="2"/>
+          </p:nvPr>
+        </p:nvSpPr>
+        <p:spPr>
+          <a:xfrm>
+            <a:off x="381000" y="685800"/>
+            <a:ext cx="6096000" cy="3429000"/>
+          </a:xfrm>
+          <a:custGeom>
+            <a:avLst/>
+            <a:gdLst/>
+            <a:ahLst/>
+            <a:cxnLst/>
+            <a:rect l="l" t="t" r="r" b="b"/>
+            <a:pathLst>
+              <a:path w="120000" h="120000" extrusionOk="0">
+                <a:moveTo>
+                  <a:pt x="0" y="0"/>
+                </a:moveTo>
+                <a:lnTo>
+                  <a:pt x="120000" y="0"/>
+                </a:lnTo>
+                <a:lnTo>
+                  <a:pt x="120000" y="120000"/>
+                </a:lnTo>
+                <a:lnTo>
+                  <a:pt x="0" y="120000"/>
+                </a:lnTo>
+                <a:close/>
+              </a:path>
+            </a:pathLst>
+          </a:custGeom>
+        </p:spPr>
+      </p:sp>
+      <p:sp>
+        <p:nvSpPr>
+          <p:cNvPr id="222" name="Google Shape;222;ge478d14cb1_4_0:notes"/>
+          <p:cNvSpPr txBox="1">
+            <a:spLocks noGrp="1"/>
+          </p:cNvSpPr>
+          <p:nvPr>
+            <p:ph type="body" idx="1"/>
+          </p:nvPr>
+        </p:nvSpPr>
+        <p:spPr>
+          <a:xfrm>
+            <a:off x="685800" y="4343400"/>
+            <a:ext cx="5486400" cy="4114800"/>
+          </a:xfrm>
+          <a:prstGeom prst="rect">
+            <a:avLst/>
+          </a:prstGeom>
+        </p:spPr>
+        <p:txBody>
+          <a:bodyPr spcFirstLastPara="1" wrap="square" lIns="91425" tIns="91425" rIns="91425" bIns="91425" anchor="t" anchorCtr="0">
+            <a:noAutofit/>
+          </a:bodyPr>
+          <a:lstStyle/>
+          <a:p>
+            <a:pPr marL="0" lvl="0" indent="0" algn="l" rtl="0">
+              <a:spcBef>
+                <a:spcPts val="0"/>
+              </a:spcBef>
+              <a:spcAft>
+                <a:spcPts val="0"/>
+              </a:spcAft>
+              <a:buNone/>
+            </a:pPr>
+            <a:endParaRPr/>
+          </a:p>
+        </p:txBody>
+      </p:sp>
+    </p:spTree>
+    <p:extLst>
+      <p:ext uri="{BB962C8B-B14F-4D97-AF65-F5344CB8AC3E}">
+        <p14:creationId xmlns:p14="http://schemas.microsoft.com/office/powerpoint/2010/main" val="1457565951"/>
+      </p:ext>
+    </p:extLst>
+  </p:cSld>
+  <p:clrMapOvr>
+    <a:masterClrMapping/>
+  </p:clrMapOvr>
+</p:notes>
+</file>
+
+<file path=ppt/notesSlides/notesSlide24.xml><?xml version="1.0" encoding="utf-8"?>
+<p:notes xmlns:a="http://schemas.openxmlformats.org/drawingml/2006/main" xmlns:r="http://schemas.openxmlformats.org/officeDocument/2006/relationships" xmlns:p="http://schemas.openxmlformats.org/presentationml/2006/main" showMasterSp="0" showMasterPhAnim="0">
+  <p:cSld>
+    <p:spTree>
+      <p:nvGrpSpPr>
+        <p:cNvPr id="1" name="Shape 220"/>
+        <p:cNvGrpSpPr/>
+        <p:nvPr/>
+      </p:nvGrpSpPr>
+      <p:grpSpPr>
+        <a:xfrm>
+          <a:off x="0" y="0"/>
+          <a:ext cx="0" cy="0"/>
+          <a:chOff x="0" y="0"/>
+          <a:chExt cx="0" cy="0"/>
+        </a:xfrm>
+      </p:grpSpPr>
+      <p:sp>
+        <p:nvSpPr>
+          <p:cNvPr id="221" name="Google Shape;221;ge478d14cb1_4_0:notes"/>
+          <p:cNvSpPr>
+            <a:spLocks noGrp="1" noRot="1" noChangeAspect="1"/>
+          </p:cNvSpPr>
+          <p:nvPr>
+            <p:ph type="sldImg" idx="2"/>
+          </p:nvPr>
+        </p:nvSpPr>
+        <p:spPr>
+          <a:xfrm>
+            <a:off x="381000" y="685800"/>
+            <a:ext cx="6096000" cy="3429000"/>
+          </a:xfrm>
+          <a:custGeom>
+            <a:avLst/>
+            <a:gdLst/>
+            <a:ahLst/>
+            <a:cxnLst/>
+            <a:rect l="l" t="t" r="r" b="b"/>
+            <a:pathLst>
+              <a:path w="120000" h="120000" extrusionOk="0">
+                <a:moveTo>
+                  <a:pt x="0" y="0"/>
+                </a:moveTo>
+                <a:lnTo>
+                  <a:pt x="120000" y="0"/>
+                </a:lnTo>
+                <a:lnTo>
+                  <a:pt x="120000" y="120000"/>
+                </a:lnTo>
+                <a:lnTo>
+                  <a:pt x="0" y="120000"/>
+                </a:lnTo>
+                <a:close/>
+              </a:path>
+            </a:pathLst>
+          </a:custGeom>
+        </p:spPr>
+      </p:sp>
+      <p:sp>
+        <p:nvSpPr>
+          <p:cNvPr id="222" name="Google Shape;222;ge478d14cb1_4_0:notes"/>
+          <p:cNvSpPr txBox="1">
+            <a:spLocks noGrp="1"/>
+          </p:cNvSpPr>
+          <p:nvPr>
+            <p:ph type="body" idx="1"/>
+          </p:nvPr>
+        </p:nvSpPr>
+        <p:spPr>
+          <a:xfrm>
+            <a:off x="685800" y="4343400"/>
+            <a:ext cx="5486400" cy="4114800"/>
+          </a:xfrm>
+          <a:prstGeom prst="rect">
+            <a:avLst/>
+          </a:prstGeom>
+        </p:spPr>
+        <p:txBody>
+          <a:bodyPr spcFirstLastPara="1" wrap="square" lIns="91425" tIns="91425" rIns="91425" bIns="91425" anchor="t" anchorCtr="0">
+            <a:noAutofit/>
+          </a:bodyPr>
+          <a:lstStyle/>
+          <a:p>
+            <a:pPr marL="0" lvl="0" indent="0" algn="l" rtl="0">
+              <a:spcBef>
+                <a:spcPts val="0"/>
+              </a:spcBef>
+              <a:spcAft>
+                <a:spcPts val="0"/>
+              </a:spcAft>
+              <a:buNone/>
+            </a:pPr>
+            <a:endParaRPr/>
+          </a:p>
+        </p:txBody>
+      </p:sp>
+    </p:spTree>
+    <p:extLst>
+      <p:ext uri="{BB962C8B-B14F-4D97-AF65-F5344CB8AC3E}">
+        <p14:creationId xmlns:p14="http://schemas.microsoft.com/office/powerpoint/2010/main" val="183234904"/>
+      </p:ext>
+    </p:extLst>
   </p:cSld>
   <p:clrMapOvr>
     <a:masterClrMapping/>
@@ -13678,6 +14009,574 @@
 </p:sld>
 </file>
 
+<file path=ppt/slides/slide22.xml><?xml version="1.0" encoding="utf-8"?>
+<p:sld xmlns:a="http://schemas.openxmlformats.org/drawingml/2006/main" xmlns:r="http://schemas.openxmlformats.org/officeDocument/2006/relationships" xmlns:p="http://schemas.openxmlformats.org/presentationml/2006/main">
+  <p:cSld>
+    <p:spTree>
+      <p:nvGrpSpPr>
+        <p:cNvPr id="1" name="Shape 223"/>
+        <p:cNvGrpSpPr/>
+        <p:nvPr/>
+      </p:nvGrpSpPr>
+      <p:grpSpPr>
+        <a:xfrm>
+          <a:off x="0" y="0"/>
+          <a:ext cx="0" cy="0"/>
+          <a:chOff x="0" y="0"/>
+          <a:chExt cx="0" cy="0"/>
+        </a:xfrm>
+      </p:grpSpPr>
+      <p:sp>
+        <p:nvSpPr>
+          <p:cNvPr id="224" name="Google Shape;224;p33"/>
+          <p:cNvSpPr txBox="1">
+            <a:spLocks noGrp="1"/>
+          </p:cNvSpPr>
+          <p:nvPr>
+            <p:ph type="title"/>
+          </p:nvPr>
+        </p:nvSpPr>
+        <p:spPr>
+          <a:xfrm>
+            <a:off x="221166" y="159123"/>
+            <a:ext cx="1965156" cy="607800"/>
+          </a:xfrm>
+          <a:prstGeom prst="rect">
+            <a:avLst/>
+          </a:prstGeom>
+          <a:solidFill>
+            <a:schemeClr val="bg2">
+              <a:lumMod val="50000"/>
+              <a:alpha val="81324"/>
+            </a:schemeClr>
+          </a:solidFill>
+        </p:spPr>
+        <p:txBody>
+          <a:bodyPr spcFirstLastPara="1" wrap="square" lIns="91425" tIns="91425" rIns="91425" bIns="91425" anchor="t" anchorCtr="0">
+            <a:normAutofit fontScale="90000"/>
+          </a:bodyPr>
+          <a:lstStyle/>
+          <a:p>
+            <a:pPr marL="0" lvl="0" indent="0" algn="l" rtl="0">
+              <a:spcBef>
+                <a:spcPts val="0"/>
+              </a:spcBef>
+              <a:spcAft>
+                <a:spcPts val="0"/>
+              </a:spcAft>
+              <a:buNone/>
+            </a:pPr>
+            <a:r>
+              <a:rPr lang="en" dirty="0">
+                <a:solidFill>
+                  <a:schemeClr val="bg1"/>
+                </a:solidFill>
+              </a:rPr>
+              <a:t>Database</a:t>
+            </a:r>
+            <a:endParaRPr dirty="0">
+              <a:solidFill>
+                <a:schemeClr val="bg1"/>
+              </a:solidFill>
+            </a:endParaRPr>
+          </a:p>
+        </p:txBody>
+      </p:sp>
+      <p:pic>
+        <p:nvPicPr>
+          <p:cNvPr id="3" name="Picture 2" descr="A picture containing window&#10;&#10;Description automatically generated">
+            <a:extLst>
+              <a:ext uri="{FF2B5EF4-FFF2-40B4-BE49-F238E27FC236}">
+                <a16:creationId xmlns:a16="http://schemas.microsoft.com/office/drawing/2014/main" id="{3E515371-339D-7B4D-9DA0-9768BCD01BF9}"/>
+              </a:ext>
+            </a:extLst>
+          </p:cNvPr>
+          <p:cNvPicPr>
+            <a:picLocks noChangeAspect="1"/>
+          </p:cNvPicPr>
+          <p:nvPr/>
+        </p:nvPicPr>
+        <p:blipFill>
+          <a:blip r:embed="rId3"/>
+          <a:stretch>
+            <a:fillRect/>
+          </a:stretch>
+        </p:blipFill>
+        <p:spPr>
+          <a:xfrm>
+            <a:off x="3892990" y="1416093"/>
+            <a:ext cx="5137415" cy="3496108"/>
+          </a:xfrm>
+          <a:prstGeom prst="rect">
+            <a:avLst/>
+          </a:prstGeom>
+        </p:spPr>
+      </p:pic>
+      <p:pic>
+        <p:nvPicPr>
+          <p:cNvPr id="7" name="Picture 6" descr="Graphical user interface, text, application&#10;&#10;Description automatically generated">
+            <a:extLst>
+              <a:ext uri="{FF2B5EF4-FFF2-40B4-BE49-F238E27FC236}">
+                <a16:creationId xmlns:a16="http://schemas.microsoft.com/office/drawing/2014/main" id="{975DE215-8286-4C41-BEAB-06F1B9ECA96B}"/>
+              </a:ext>
+            </a:extLst>
+          </p:cNvPr>
+          <p:cNvPicPr>
+            <a:picLocks noChangeAspect="1"/>
+          </p:cNvPicPr>
+          <p:nvPr/>
+        </p:nvPicPr>
+        <p:blipFill>
+          <a:blip r:embed="rId4"/>
+          <a:stretch>
+            <a:fillRect/>
+          </a:stretch>
+        </p:blipFill>
+        <p:spPr>
+          <a:xfrm>
+            <a:off x="113595" y="1416093"/>
+            <a:ext cx="3692507" cy="2350149"/>
+          </a:xfrm>
+          <a:prstGeom prst="rect">
+            <a:avLst/>
+          </a:prstGeom>
+        </p:spPr>
+      </p:pic>
+      <p:sp>
+        <p:nvSpPr>
+          <p:cNvPr id="8" name="TextBox 7">
+            <a:extLst>
+              <a:ext uri="{FF2B5EF4-FFF2-40B4-BE49-F238E27FC236}">
+                <a16:creationId xmlns:a16="http://schemas.microsoft.com/office/drawing/2014/main" id="{6CF13483-484C-5449-8D8C-6882D11E9C88}"/>
+              </a:ext>
+            </a:extLst>
+          </p:cNvPr>
+          <p:cNvSpPr txBox="1"/>
+          <p:nvPr/>
+        </p:nvSpPr>
+        <p:spPr>
+          <a:xfrm>
+            <a:off x="113595" y="677429"/>
+            <a:ext cx="7907775" cy="523220"/>
+          </a:xfrm>
+          <a:prstGeom prst="rect">
+            <a:avLst/>
+          </a:prstGeom>
+          <a:noFill/>
+        </p:spPr>
+        <p:txBody>
+          <a:bodyPr wrap="square" rtlCol="0">
+            <a:spAutoFit/>
+          </a:bodyPr>
+          <a:lstStyle/>
+          <a:p>
+            <a:r>
+              <a:rPr lang="en-US" dirty="0">
+                <a:solidFill>
+                  <a:schemeClr val="bg1"/>
+                </a:solidFill>
+              </a:rPr>
+              <a:t>The database was joined by using the query below using the Kaggle dataset and season and quarter dataset. </a:t>
+            </a:r>
+          </a:p>
+        </p:txBody>
+      </p:sp>
+    </p:spTree>
+    <p:extLst>
+      <p:ext uri="{BB962C8B-B14F-4D97-AF65-F5344CB8AC3E}">
+        <p14:creationId xmlns:p14="http://schemas.microsoft.com/office/powerpoint/2010/main" val="1958712306"/>
+      </p:ext>
+    </p:extLst>
+  </p:cSld>
+  <p:clrMapOvr>
+    <a:masterClrMapping/>
+  </p:clrMapOvr>
+</p:sld>
+</file>
+
+<file path=ppt/slides/slide23.xml><?xml version="1.0" encoding="utf-8"?>
+<p:sld xmlns:a="http://schemas.openxmlformats.org/drawingml/2006/main" xmlns:r="http://schemas.openxmlformats.org/officeDocument/2006/relationships" xmlns:p="http://schemas.openxmlformats.org/presentationml/2006/main">
+  <p:cSld>
+    <p:spTree>
+      <p:nvGrpSpPr>
+        <p:cNvPr id="1" name="Shape 223"/>
+        <p:cNvGrpSpPr/>
+        <p:nvPr/>
+      </p:nvGrpSpPr>
+      <p:grpSpPr>
+        <a:xfrm>
+          <a:off x="0" y="0"/>
+          <a:ext cx="0" cy="0"/>
+          <a:chOff x="0" y="0"/>
+          <a:chExt cx="0" cy="0"/>
+        </a:xfrm>
+      </p:grpSpPr>
+      <p:sp>
+        <p:nvSpPr>
+          <p:cNvPr id="224" name="Google Shape;224;p33"/>
+          <p:cNvSpPr txBox="1">
+            <a:spLocks noGrp="1"/>
+          </p:cNvSpPr>
+          <p:nvPr>
+            <p:ph type="title"/>
+          </p:nvPr>
+        </p:nvSpPr>
+        <p:spPr>
+          <a:xfrm>
+            <a:off x="311700" y="410000"/>
+            <a:ext cx="1965156" cy="607800"/>
+          </a:xfrm>
+          <a:prstGeom prst="rect">
+            <a:avLst/>
+          </a:prstGeom>
+          <a:solidFill>
+            <a:schemeClr val="bg2">
+              <a:lumMod val="50000"/>
+              <a:alpha val="81324"/>
+            </a:schemeClr>
+          </a:solidFill>
+        </p:spPr>
+        <p:txBody>
+          <a:bodyPr spcFirstLastPara="1" wrap="square" lIns="91425" tIns="91425" rIns="91425" bIns="91425" anchor="t" anchorCtr="0">
+            <a:normAutofit fontScale="90000"/>
+          </a:bodyPr>
+          <a:lstStyle/>
+          <a:p>
+            <a:pPr marL="0" lvl="0" indent="0" algn="l" rtl="0">
+              <a:spcBef>
+                <a:spcPts val="0"/>
+              </a:spcBef>
+              <a:spcAft>
+                <a:spcPts val="0"/>
+              </a:spcAft>
+              <a:buNone/>
+            </a:pPr>
+            <a:r>
+              <a:rPr lang="en" dirty="0">
+                <a:solidFill>
+                  <a:schemeClr val="bg1"/>
+                </a:solidFill>
+              </a:rPr>
+              <a:t>R-Analysis</a:t>
+            </a:r>
+            <a:endParaRPr dirty="0">
+              <a:solidFill>
+                <a:schemeClr val="bg1"/>
+              </a:solidFill>
+            </a:endParaRPr>
+          </a:p>
+        </p:txBody>
+      </p:sp>
+      <p:sp>
+        <p:nvSpPr>
+          <p:cNvPr id="8" name="TextBox 7">
+            <a:extLst>
+              <a:ext uri="{FF2B5EF4-FFF2-40B4-BE49-F238E27FC236}">
+                <a16:creationId xmlns:a16="http://schemas.microsoft.com/office/drawing/2014/main" id="{6CF13483-484C-5449-8D8C-6882D11E9C88}"/>
+              </a:ext>
+            </a:extLst>
+          </p:cNvPr>
+          <p:cNvSpPr txBox="1"/>
+          <p:nvPr/>
+        </p:nvSpPr>
+        <p:spPr>
+          <a:xfrm>
+            <a:off x="113595" y="936301"/>
+            <a:ext cx="6726725" cy="307777"/>
+          </a:xfrm>
+          <a:prstGeom prst="rect">
+            <a:avLst/>
+          </a:prstGeom>
+          <a:noFill/>
+        </p:spPr>
+        <p:txBody>
+          <a:bodyPr wrap="square" rtlCol="0">
+            <a:spAutoFit/>
+          </a:bodyPr>
+          <a:lstStyle/>
+          <a:p>
+            <a:r>
+              <a:rPr lang="en-US" dirty="0">
+                <a:solidFill>
+                  <a:schemeClr val="bg1"/>
+                </a:solidFill>
+              </a:rPr>
+              <a:t>Total Volume by months, year and seasons.</a:t>
+            </a:r>
+          </a:p>
+        </p:txBody>
+      </p:sp>
+      <p:pic>
+        <p:nvPicPr>
+          <p:cNvPr id="6" name="Picture 5" descr="Chart, line chart&#10;&#10;Description automatically generated">
+            <a:extLst>
+              <a:ext uri="{FF2B5EF4-FFF2-40B4-BE49-F238E27FC236}">
+                <a16:creationId xmlns:a16="http://schemas.microsoft.com/office/drawing/2014/main" id="{1A78CCF4-9838-1440-A1D2-2DE5898A0CDB}"/>
+              </a:ext>
+            </a:extLst>
+          </p:cNvPr>
+          <p:cNvPicPr>
+            <a:picLocks noChangeAspect="1"/>
+          </p:cNvPicPr>
+          <p:nvPr/>
+        </p:nvPicPr>
+        <p:blipFill>
+          <a:blip r:embed="rId3"/>
+          <a:stretch>
+            <a:fillRect/>
+          </a:stretch>
+        </p:blipFill>
+        <p:spPr>
+          <a:xfrm>
+            <a:off x="106324" y="1494792"/>
+            <a:ext cx="4341063" cy="2746706"/>
+          </a:xfrm>
+          <a:prstGeom prst="rect">
+            <a:avLst/>
+          </a:prstGeom>
+        </p:spPr>
+      </p:pic>
+      <p:pic>
+        <p:nvPicPr>
+          <p:cNvPr id="10" name="Picture 9" descr="Chart, scatter chart&#10;&#10;Description automatically generated">
+            <a:extLst>
+              <a:ext uri="{FF2B5EF4-FFF2-40B4-BE49-F238E27FC236}">
+                <a16:creationId xmlns:a16="http://schemas.microsoft.com/office/drawing/2014/main" id="{370582C5-4DB8-314A-85E1-DBA6611C0376}"/>
+              </a:ext>
+            </a:extLst>
+          </p:cNvPr>
+          <p:cNvPicPr>
+            <a:picLocks noChangeAspect="1"/>
+          </p:cNvPicPr>
+          <p:nvPr/>
+        </p:nvPicPr>
+        <p:blipFill>
+          <a:blip r:embed="rId4"/>
+          <a:stretch>
+            <a:fillRect/>
+          </a:stretch>
+        </p:blipFill>
+        <p:spPr>
+          <a:xfrm>
+            <a:off x="4750692" y="1494792"/>
+            <a:ext cx="4179255" cy="2746706"/>
+          </a:xfrm>
+          <a:prstGeom prst="rect">
+            <a:avLst/>
+          </a:prstGeom>
+        </p:spPr>
+      </p:pic>
+    </p:spTree>
+    <p:extLst>
+      <p:ext uri="{BB962C8B-B14F-4D97-AF65-F5344CB8AC3E}">
+        <p14:creationId xmlns:p14="http://schemas.microsoft.com/office/powerpoint/2010/main" val="3708873856"/>
+      </p:ext>
+    </p:extLst>
+  </p:cSld>
+  <p:clrMapOvr>
+    <a:masterClrMapping/>
+  </p:clrMapOvr>
+</p:sld>
+</file>
+
+<file path=ppt/slides/slide24.xml><?xml version="1.0" encoding="utf-8"?>
+<p:sld xmlns:a="http://schemas.openxmlformats.org/drawingml/2006/main" xmlns:r="http://schemas.openxmlformats.org/officeDocument/2006/relationships" xmlns:p="http://schemas.openxmlformats.org/presentationml/2006/main">
+  <p:cSld>
+    <p:spTree>
+      <p:nvGrpSpPr>
+        <p:cNvPr id="1" name="Shape 223"/>
+        <p:cNvGrpSpPr/>
+        <p:nvPr/>
+      </p:nvGrpSpPr>
+      <p:grpSpPr>
+        <a:xfrm>
+          <a:off x="0" y="0"/>
+          <a:ext cx="0" cy="0"/>
+          <a:chOff x="0" y="0"/>
+          <a:chExt cx="0" cy="0"/>
+        </a:xfrm>
+      </p:grpSpPr>
+      <p:sp>
+        <p:nvSpPr>
+          <p:cNvPr id="224" name="Google Shape;224;p33"/>
+          <p:cNvSpPr txBox="1">
+            <a:spLocks noGrp="1"/>
+          </p:cNvSpPr>
+          <p:nvPr>
+            <p:ph type="title"/>
+          </p:nvPr>
+        </p:nvSpPr>
+        <p:spPr>
+          <a:xfrm>
+            <a:off x="311700" y="410000"/>
+            <a:ext cx="1965156" cy="607800"/>
+          </a:xfrm>
+          <a:prstGeom prst="rect">
+            <a:avLst/>
+          </a:prstGeom>
+          <a:solidFill>
+            <a:schemeClr val="bg2">
+              <a:lumMod val="50000"/>
+              <a:alpha val="81324"/>
+            </a:schemeClr>
+          </a:solidFill>
+        </p:spPr>
+        <p:txBody>
+          <a:bodyPr spcFirstLastPara="1" wrap="square" lIns="91425" tIns="91425" rIns="91425" bIns="91425" anchor="t" anchorCtr="0">
+            <a:normAutofit fontScale="90000"/>
+          </a:bodyPr>
+          <a:lstStyle/>
+          <a:p>
+            <a:pPr marL="0" lvl="0" indent="0" algn="l" rtl="0">
+              <a:spcBef>
+                <a:spcPts val="0"/>
+              </a:spcBef>
+              <a:spcAft>
+                <a:spcPts val="0"/>
+              </a:spcAft>
+              <a:buNone/>
+            </a:pPr>
+            <a:r>
+              <a:rPr lang="en" dirty="0">
+                <a:solidFill>
+                  <a:schemeClr val="bg1"/>
+                </a:solidFill>
+              </a:rPr>
+              <a:t>R-Analysis</a:t>
+            </a:r>
+            <a:endParaRPr dirty="0">
+              <a:solidFill>
+                <a:schemeClr val="bg1"/>
+              </a:solidFill>
+            </a:endParaRPr>
+          </a:p>
+        </p:txBody>
+      </p:sp>
+      <p:sp>
+        <p:nvSpPr>
+          <p:cNvPr id="8" name="TextBox 7">
+            <a:extLst>
+              <a:ext uri="{FF2B5EF4-FFF2-40B4-BE49-F238E27FC236}">
+                <a16:creationId xmlns:a16="http://schemas.microsoft.com/office/drawing/2014/main" id="{6CF13483-484C-5449-8D8C-6882D11E9C88}"/>
+              </a:ext>
+            </a:extLst>
+          </p:cNvPr>
+          <p:cNvSpPr txBox="1"/>
+          <p:nvPr/>
+        </p:nvSpPr>
+        <p:spPr>
+          <a:xfrm>
+            <a:off x="113595" y="936301"/>
+            <a:ext cx="6726725" cy="307777"/>
+          </a:xfrm>
+          <a:prstGeom prst="rect">
+            <a:avLst/>
+          </a:prstGeom>
+          <a:noFill/>
+        </p:spPr>
+        <p:txBody>
+          <a:bodyPr wrap="square" rtlCol="0">
+            <a:spAutoFit/>
+          </a:bodyPr>
+          <a:lstStyle/>
+          <a:p>
+            <a:r>
+              <a:rPr lang="en-US" dirty="0">
+                <a:solidFill>
+                  <a:schemeClr val="bg1"/>
+                </a:solidFill>
+              </a:rPr>
+              <a:t>Summary showing last 5 years volume price for seasons </a:t>
+            </a:r>
+            <a:r>
+              <a:rPr lang="en-US">
+                <a:solidFill>
+                  <a:schemeClr val="bg1"/>
+                </a:solidFill>
+              </a:rPr>
+              <a:t>and quarters</a:t>
+            </a:r>
+            <a:endParaRPr lang="en-US" dirty="0">
+              <a:solidFill>
+                <a:schemeClr val="bg1"/>
+              </a:solidFill>
+            </a:endParaRPr>
+          </a:p>
+        </p:txBody>
+      </p:sp>
+      <p:pic>
+        <p:nvPicPr>
+          <p:cNvPr id="3" name="Picture 2" descr="Chart, scatter chart&#10;&#10;Description automatically generated">
+            <a:extLst>
+              <a:ext uri="{FF2B5EF4-FFF2-40B4-BE49-F238E27FC236}">
+                <a16:creationId xmlns:a16="http://schemas.microsoft.com/office/drawing/2014/main" id="{2C929D31-A339-AD40-97BB-606E4FF7A9F4}"/>
+              </a:ext>
+            </a:extLst>
+          </p:cNvPr>
+          <p:cNvPicPr>
+            <a:picLocks noChangeAspect="1"/>
+          </p:cNvPicPr>
+          <p:nvPr/>
+        </p:nvPicPr>
+        <p:blipFill>
+          <a:blip r:embed="rId3"/>
+          <a:stretch>
+            <a:fillRect/>
+          </a:stretch>
+        </p:blipFill>
+        <p:spPr>
+          <a:xfrm>
+            <a:off x="112638" y="1372651"/>
+            <a:ext cx="4328436" cy="2868847"/>
+          </a:xfrm>
+          <a:prstGeom prst="rect">
+            <a:avLst/>
+          </a:prstGeom>
+        </p:spPr>
+      </p:pic>
+      <p:pic>
+        <p:nvPicPr>
+          <p:cNvPr id="5" name="Picture 4" descr="Chart, scatter chart&#10;&#10;Description automatically generated">
+            <a:extLst>
+              <a:ext uri="{FF2B5EF4-FFF2-40B4-BE49-F238E27FC236}">
+                <a16:creationId xmlns:a16="http://schemas.microsoft.com/office/drawing/2014/main" id="{D73BED24-3C87-7E4E-B8DC-CF2D2131FA33}"/>
+              </a:ext>
+            </a:extLst>
+          </p:cNvPr>
+          <p:cNvPicPr>
+            <a:picLocks noChangeAspect="1"/>
+          </p:cNvPicPr>
+          <p:nvPr/>
+        </p:nvPicPr>
+        <p:blipFill>
+          <a:blip r:embed="rId4"/>
+          <a:stretch>
+            <a:fillRect/>
+          </a:stretch>
+        </p:blipFill>
+        <p:spPr>
+          <a:xfrm>
+            <a:off x="4720387" y="1406950"/>
+            <a:ext cx="4423613" cy="2834548"/>
+          </a:xfrm>
+          <a:prstGeom prst="rect">
+            <a:avLst/>
+          </a:prstGeom>
+        </p:spPr>
+      </p:pic>
+    </p:spTree>
+    <p:extLst>
+      <p:ext uri="{BB962C8B-B14F-4D97-AF65-F5344CB8AC3E}">
+        <p14:creationId xmlns:p14="http://schemas.microsoft.com/office/powerpoint/2010/main" val="705801858"/>
+      </p:ext>
+    </p:extLst>
+  </p:cSld>
+  <p:clrMapOvr>
+    <a:masterClrMapping/>
+  </p:clrMapOvr>
+</p:sld>
+</file>
+
 <file path=ppt/slides/slide3.xml><?xml version="1.0" encoding="utf-8"?>
 <p:sld xmlns:a="http://schemas.openxmlformats.org/drawingml/2006/main" xmlns:r="http://schemas.openxmlformats.org/officeDocument/2006/relationships" xmlns:p="http://schemas.openxmlformats.org/presentationml/2006/main">
   <p:cSld>

</xml_diff>

<commit_message>
Updated the readme and candlestick image
</commit_message>
<xml_diff>
--- a/SEGMENT 2/Group 10 PowerPoint_Segment_2.pptx
+++ b/SEGMENT 2/Group 10 PowerPoint_Segment_2.pptx
@@ -5,7 +5,7 @@
     <p:sldMasterId id="2147483659" r:id="rId1"/>
   </p:sldMasterIdLst>
   <p:notesMasterIdLst>
-    <p:notesMasterId r:id="rId26"/>
+    <p:notesMasterId r:id="rId29"/>
   </p:notesMasterIdLst>
   <p:sldIdLst>
     <p:sldId id="256" r:id="rId2"/>
@@ -29,33 +29,36 @@
     <p:sldId id="274" r:id="rId20"/>
     <p:sldId id="275" r:id="rId21"/>
     <p:sldId id="276" r:id="rId22"/>
-    <p:sldId id="277" r:id="rId23"/>
-    <p:sldId id="278" r:id="rId24"/>
-    <p:sldId id="279" r:id="rId25"/>
+    <p:sldId id="280" r:id="rId23"/>
+    <p:sldId id="281" r:id="rId24"/>
+    <p:sldId id="282" r:id="rId25"/>
+    <p:sldId id="277" r:id="rId26"/>
+    <p:sldId id="278" r:id="rId27"/>
+    <p:sldId id="279" r:id="rId28"/>
   </p:sldIdLst>
   <p:sldSz cx="9144000" cy="5143500" type="screen16x9"/>
   <p:notesSz cx="6858000" cy="9144000"/>
   <p:embeddedFontLst>
     <p:embeddedFont>
       <p:font typeface="Calibri" panose="020F0502020204030204" pitchFamily="34" charset="0"/>
-      <p:regular r:id="rId27"/>
-      <p:bold r:id="rId28"/>
-      <p:italic r:id="rId29"/>
-      <p:boldItalic r:id="rId30"/>
+      <p:regular r:id="rId30"/>
+      <p:bold r:id="rId31"/>
+      <p:italic r:id="rId32"/>
+      <p:boldItalic r:id="rId33"/>
     </p:embeddedFont>
     <p:embeddedFont>
       <p:font typeface="Georgia" panose="02040502050405020303" pitchFamily="18" charset="0"/>
-      <p:regular r:id="rId31"/>
-      <p:bold r:id="rId32"/>
-      <p:italic r:id="rId33"/>
-      <p:boldItalic r:id="rId34"/>
+      <p:regular r:id="rId34"/>
+      <p:bold r:id="rId35"/>
+      <p:italic r:id="rId36"/>
+      <p:boldItalic r:id="rId37"/>
     </p:embeddedFont>
     <p:embeddedFont>
       <p:font typeface="Roboto" panose="02000000000000000000" pitchFamily="2" charset="0"/>
-      <p:regular r:id="rId35"/>
-      <p:bold r:id="rId36"/>
-      <p:italic r:id="rId37"/>
-      <p:boldItalic r:id="rId38"/>
+      <p:regular r:id="rId38"/>
+      <p:bold r:id="rId39"/>
+      <p:italic r:id="rId40"/>
+      <p:boldItalic r:id="rId41"/>
     </p:embeddedFont>
   </p:embeddedFontLst>
   <p:defaultTextStyle>
@@ -13828,10 +13831,6 @@
           </p:nvPr>
         </p:nvSpPr>
         <p:spPr>
-          <a:xfrm>
-            <a:off x="311700" y="410000"/>
-            <a:ext cx="1965156" cy="607800"/>
-          </a:xfrm>
           <a:prstGeom prst="rect">
             <a:avLst/>
           </a:prstGeom>
@@ -13884,10 +13883,6 @@
           </p:nvPr>
         </p:nvSpPr>
         <p:spPr>
-          <a:xfrm>
-            <a:off x="311700" y="1229875"/>
-            <a:ext cx="4260300" cy="3339000"/>
-          </a:xfrm>
           <a:prstGeom prst="rect">
             <a:avLst/>
           </a:prstGeom>
@@ -13900,7 +13895,7 @@
         </p:spPr>
         <p:txBody>
           <a:bodyPr spcFirstLastPara="1" wrap="square" lIns="91425" tIns="91425" rIns="91425" bIns="91425" anchor="t" anchorCtr="0">
-            <a:normAutofit lnSpcReduction="10000"/>
+            <a:normAutofit/>
           </a:bodyPr>
           <a:lstStyle/>
           <a:p>
@@ -13970,6 +13965,31 @@
               <a:t>https://public.tableau.com/app/profile/opy.shoffy/viz/Final_Project_10_16277782240420/QuarterlyGainLoss</a:t>
             </a:r>
             <a:endParaRPr dirty="0"/>
+          </a:p>
+        </p:txBody>
+      </p:sp>
+      <p:sp>
+        <p:nvSpPr>
+          <p:cNvPr id="2" name="Text Placeholder 1">
+            <a:extLst>
+              <a:ext uri="{FF2B5EF4-FFF2-40B4-BE49-F238E27FC236}">
+                <a16:creationId xmlns:a16="http://schemas.microsoft.com/office/drawing/2014/main" id="{F66B20FD-113C-44C6-A356-E670A6879406}"/>
+              </a:ext>
+            </a:extLst>
+          </p:cNvPr>
+          <p:cNvSpPr>
+            <a:spLocks noGrp="1"/>
+          </p:cNvSpPr>
+          <p:nvPr>
+            <p:ph type="body" idx="2"/>
+          </p:nvPr>
+        </p:nvSpPr>
+        <p:spPr/>
+        <p:txBody>
+          <a:bodyPr/>
+          <a:lstStyle/>
+          <a:p>
+            <a:endParaRPr lang="en-US"/>
           </a:p>
         </p:txBody>
       </p:sp>
@@ -14010,6 +14030,518 @@
 </file>
 
 <file path=ppt/slides/slide22.xml><?xml version="1.0" encoding="utf-8"?>
+<p:sld xmlns:a="http://schemas.openxmlformats.org/drawingml/2006/main" xmlns:r="http://schemas.openxmlformats.org/officeDocument/2006/relationships" xmlns:p="http://schemas.openxmlformats.org/presentationml/2006/main">
+  <p:cSld>
+    <p:spTree>
+      <p:nvGrpSpPr>
+        <p:cNvPr id="1" name=""/>
+        <p:cNvGrpSpPr/>
+        <p:nvPr/>
+      </p:nvGrpSpPr>
+      <p:grpSpPr>
+        <a:xfrm>
+          <a:off x="0" y="0"/>
+          <a:ext cx="0" cy="0"/>
+          <a:chOff x="0" y="0"/>
+          <a:chExt cx="0" cy="0"/>
+        </a:xfrm>
+      </p:grpSpPr>
+      <p:sp>
+        <p:nvSpPr>
+          <p:cNvPr id="2" name="Title 1">
+            <a:extLst>
+              <a:ext uri="{FF2B5EF4-FFF2-40B4-BE49-F238E27FC236}">
+                <a16:creationId xmlns:a16="http://schemas.microsoft.com/office/drawing/2014/main" id="{653026E1-03E4-4F6F-A4D6-D051600407B0}"/>
+              </a:ext>
+            </a:extLst>
+          </p:cNvPr>
+          <p:cNvSpPr>
+            <a:spLocks noGrp="1"/>
+          </p:cNvSpPr>
+          <p:nvPr>
+            <p:ph type="title"/>
+          </p:nvPr>
+        </p:nvSpPr>
+        <p:spPr/>
+        <p:txBody>
+          <a:bodyPr>
+            <a:normAutofit fontScale="90000"/>
+          </a:bodyPr>
+          <a:lstStyle/>
+          <a:p>
+            <a:r>
+              <a:rPr lang="en-US" dirty="0">
+                <a:solidFill>
+                  <a:schemeClr val="bg1"/>
+                </a:solidFill>
+              </a:rPr>
+              <a:t>Candlestick Analysis</a:t>
+            </a:r>
+          </a:p>
+        </p:txBody>
+      </p:sp>
+      <p:sp>
+        <p:nvSpPr>
+          <p:cNvPr id="3" name="Text Placeholder 2">
+            <a:extLst>
+              <a:ext uri="{FF2B5EF4-FFF2-40B4-BE49-F238E27FC236}">
+                <a16:creationId xmlns:a16="http://schemas.microsoft.com/office/drawing/2014/main" id="{F98F569A-1C0D-4CA1-A8F0-0B529ABA9582}"/>
+              </a:ext>
+            </a:extLst>
+          </p:cNvPr>
+          <p:cNvSpPr>
+            <a:spLocks noGrp="1"/>
+          </p:cNvSpPr>
+          <p:nvPr>
+            <p:ph type="body" idx="1"/>
+          </p:nvPr>
+        </p:nvSpPr>
+        <p:spPr/>
+        <p:txBody>
+          <a:bodyPr/>
+          <a:lstStyle/>
+          <a:p>
+            <a:endParaRPr lang="en-US" dirty="0"/>
+          </a:p>
+        </p:txBody>
+      </p:sp>
+      <p:sp>
+        <p:nvSpPr>
+          <p:cNvPr id="4" name="Text Placeholder 3">
+            <a:extLst>
+              <a:ext uri="{FF2B5EF4-FFF2-40B4-BE49-F238E27FC236}">
+                <a16:creationId xmlns:a16="http://schemas.microsoft.com/office/drawing/2014/main" id="{03CDDA01-4096-40E2-AE85-B4922FBE1ACD}"/>
+              </a:ext>
+            </a:extLst>
+          </p:cNvPr>
+          <p:cNvSpPr>
+            <a:spLocks noGrp="1"/>
+          </p:cNvSpPr>
+          <p:nvPr>
+            <p:ph type="body" idx="2"/>
+          </p:nvPr>
+        </p:nvSpPr>
+        <p:spPr/>
+        <p:txBody>
+          <a:bodyPr/>
+          <a:lstStyle/>
+          <a:p>
+            <a:r>
+              <a:rPr lang="en-US" dirty="0">
+                <a:solidFill>
+                  <a:schemeClr val="bg1"/>
+                </a:solidFill>
+              </a:rPr>
+              <a:t>Steady increase in price over a period of 5 years</a:t>
+            </a:r>
+          </a:p>
+          <a:p>
+            <a:r>
+              <a:rPr lang="en-US" dirty="0">
+                <a:solidFill>
+                  <a:schemeClr val="bg1"/>
+                </a:solidFill>
+              </a:rPr>
+              <a:t>There’s usually a rise in volume at the beginning of every year until 2020 when there was a deep</a:t>
+            </a:r>
+          </a:p>
+          <a:p>
+            <a:endParaRPr lang="en-US" dirty="0"/>
+          </a:p>
+        </p:txBody>
+      </p:sp>
+      <p:pic>
+        <p:nvPicPr>
+          <p:cNvPr id="6" name="Picture 5" descr="Graphical user interface, chart&#10;&#10;Description automatically generated">
+            <a:extLst>
+              <a:ext uri="{FF2B5EF4-FFF2-40B4-BE49-F238E27FC236}">
+                <a16:creationId xmlns:a16="http://schemas.microsoft.com/office/drawing/2014/main" id="{50369589-EF33-41DA-9F7E-9D6B42465624}"/>
+              </a:ext>
+            </a:extLst>
+          </p:cNvPr>
+          <p:cNvPicPr>
+            <a:picLocks noChangeAspect="1"/>
+          </p:cNvPicPr>
+          <p:nvPr/>
+        </p:nvPicPr>
+        <p:blipFill>
+          <a:blip r:embed="rId2"/>
+          <a:stretch>
+            <a:fillRect/>
+          </a:stretch>
+        </p:blipFill>
+        <p:spPr>
+          <a:xfrm>
+            <a:off x="-406825" y="1229975"/>
+            <a:ext cx="4828572" cy="3913525"/>
+          </a:xfrm>
+          <a:prstGeom prst="rect">
+            <a:avLst/>
+          </a:prstGeom>
+        </p:spPr>
+      </p:pic>
+    </p:spTree>
+    <p:extLst>
+      <p:ext uri="{BB962C8B-B14F-4D97-AF65-F5344CB8AC3E}">
+        <p14:creationId xmlns:p14="http://schemas.microsoft.com/office/powerpoint/2010/main" val="703367154"/>
+      </p:ext>
+    </p:extLst>
+  </p:cSld>
+  <p:clrMapOvr>
+    <a:masterClrMapping/>
+  </p:clrMapOvr>
+</p:sld>
+</file>
+
+<file path=ppt/slides/slide23.xml><?xml version="1.0" encoding="utf-8"?>
+<p:sld xmlns:a="http://schemas.openxmlformats.org/drawingml/2006/main" xmlns:r="http://schemas.openxmlformats.org/officeDocument/2006/relationships" xmlns:p="http://schemas.openxmlformats.org/presentationml/2006/main">
+  <p:cSld>
+    <p:spTree>
+      <p:nvGrpSpPr>
+        <p:cNvPr id="1" name=""/>
+        <p:cNvGrpSpPr/>
+        <p:nvPr/>
+      </p:nvGrpSpPr>
+      <p:grpSpPr>
+        <a:xfrm>
+          <a:off x="0" y="0"/>
+          <a:ext cx="0" cy="0"/>
+          <a:chOff x="0" y="0"/>
+          <a:chExt cx="0" cy="0"/>
+        </a:xfrm>
+      </p:grpSpPr>
+      <p:sp>
+        <p:nvSpPr>
+          <p:cNvPr id="6" name="Title 5">
+            <a:extLst>
+              <a:ext uri="{FF2B5EF4-FFF2-40B4-BE49-F238E27FC236}">
+                <a16:creationId xmlns:a16="http://schemas.microsoft.com/office/drawing/2014/main" id="{9EBEDAFF-F4A7-4F1D-BD48-2CA6D627318F}"/>
+              </a:ext>
+            </a:extLst>
+          </p:cNvPr>
+          <p:cNvSpPr>
+            <a:spLocks noGrp="1"/>
+          </p:cNvSpPr>
+          <p:nvPr>
+            <p:ph type="title"/>
+          </p:nvPr>
+        </p:nvSpPr>
+        <p:spPr/>
+        <p:txBody>
+          <a:bodyPr>
+            <a:normAutofit fontScale="90000"/>
+          </a:bodyPr>
+          <a:lstStyle/>
+          <a:p>
+            <a:r>
+              <a:rPr lang="en-US" dirty="0">
+                <a:solidFill>
+                  <a:schemeClr val="bg1"/>
+                </a:solidFill>
+              </a:rPr>
+              <a:t>Price and Volume comparison between 1990 and 2000</a:t>
+            </a:r>
+          </a:p>
+        </p:txBody>
+      </p:sp>
+      <p:sp>
+        <p:nvSpPr>
+          <p:cNvPr id="7" name="Text Placeholder 6">
+            <a:extLst>
+              <a:ext uri="{FF2B5EF4-FFF2-40B4-BE49-F238E27FC236}">
+                <a16:creationId xmlns:a16="http://schemas.microsoft.com/office/drawing/2014/main" id="{1885AFBB-961B-4F3C-A63C-1D191D6B6ABC}"/>
+              </a:ext>
+            </a:extLst>
+          </p:cNvPr>
+          <p:cNvSpPr>
+            <a:spLocks noGrp="1"/>
+          </p:cNvSpPr>
+          <p:nvPr>
+            <p:ph type="body" idx="1"/>
+          </p:nvPr>
+        </p:nvSpPr>
+        <p:spPr/>
+        <p:txBody>
+          <a:bodyPr/>
+          <a:lstStyle/>
+          <a:p>
+            <a:endParaRPr lang="en-US" dirty="0"/>
+          </a:p>
+        </p:txBody>
+      </p:sp>
+      <p:sp>
+        <p:nvSpPr>
+          <p:cNvPr id="8" name="Text Placeholder 7">
+            <a:extLst>
+              <a:ext uri="{FF2B5EF4-FFF2-40B4-BE49-F238E27FC236}">
+                <a16:creationId xmlns:a16="http://schemas.microsoft.com/office/drawing/2014/main" id="{DA3BF5B4-4A3C-4330-A641-AA2517FCB8CC}"/>
+              </a:ext>
+            </a:extLst>
+          </p:cNvPr>
+          <p:cNvSpPr>
+            <a:spLocks noGrp="1"/>
+          </p:cNvSpPr>
+          <p:nvPr>
+            <p:ph type="body" idx="2"/>
+          </p:nvPr>
+        </p:nvSpPr>
+        <p:spPr/>
+        <p:txBody>
+          <a:bodyPr/>
+          <a:lstStyle/>
+          <a:p>
+            <a:endParaRPr lang="en-US" dirty="0"/>
+          </a:p>
+        </p:txBody>
+      </p:sp>
+      <p:pic>
+        <p:nvPicPr>
+          <p:cNvPr id="10" name="Picture 9" descr="Graphical user interface, chart&#10;&#10;Description automatically generated">
+            <a:extLst>
+              <a:ext uri="{FF2B5EF4-FFF2-40B4-BE49-F238E27FC236}">
+                <a16:creationId xmlns:a16="http://schemas.microsoft.com/office/drawing/2014/main" id="{D2B0A60D-4095-4C72-A4E4-D0BDD6428C4B}"/>
+              </a:ext>
+            </a:extLst>
+          </p:cNvPr>
+          <p:cNvPicPr>
+            <a:picLocks noChangeAspect="1"/>
+          </p:cNvPicPr>
+          <p:nvPr/>
+        </p:nvPicPr>
+        <p:blipFill>
+          <a:blip r:embed="rId2"/>
+          <a:stretch>
+            <a:fillRect/>
+          </a:stretch>
+        </p:blipFill>
+        <p:spPr>
+          <a:xfrm>
+            <a:off x="0" y="1229974"/>
+            <a:ext cx="4311600" cy="3913525"/>
+          </a:xfrm>
+          <a:prstGeom prst="rect">
+            <a:avLst/>
+          </a:prstGeom>
+        </p:spPr>
+      </p:pic>
+      <p:pic>
+        <p:nvPicPr>
+          <p:cNvPr id="12" name="Picture 11" descr="Graphical user interface, chart, scatter chart&#10;&#10;Description automatically generated">
+            <a:extLst>
+              <a:ext uri="{FF2B5EF4-FFF2-40B4-BE49-F238E27FC236}">
+                <a16:creationId xmlns:a16="http://schemas.microsoft.com/office/drawing/2014/main" id="{E3CF28F3-28E6-4885-8382-C474357C5F6B}"/>
+              </a:ext>
+            </a:extLst>
+          </p:cNvPr>
+          <p:cNvPicPr>
+            <a:picLocks noChangeAspect="1"/>
+          </p:cNvPicPr>
+          <p:nvPr/>
+        </p:nvPicPr>
+        <p:blipFill>
+          <a:blip r:embed="rId3"/>
+          <a:stretch>
+            <a:fillRect/>
+          </a:stretch>
+        </p:blipFill>
+        <p:spPr>
+          <a:xfrm>
+            <a:off x="4572000" y="1229973"/>
+            <a:ext cx="4572000" cy="3913525"/>
+          </a:xfrm>
+          <a:prstGeom prst="rect">
+            <a:avLst/>
+          </a:prstGeom>
+        </p:spPr>
+      </p:pic>
+    </p:spTree>
+    <p:extLst>
+      <p:ext uri="{BB962C8B-B14F-4D97-AF65-F5344CB8AC3E}">
+        <p14:creationId xmlns:p14="http://schemas.microsoft.com/office/powerpoint/2010/main" val="3463757910"/>
+      </p:ext>
+    </p:extLst>
+  </p:cSld>
+  <p:clrMapOvr>
+    <a:masterClrMapping/>
+  </p:clrMapOvr>
+</p:sld>
+</file>
+
+<file path=ppt/slides/slide24.xml><?xml version="1.0" encoding="utf-8"?>
+<p:sld xmlns:a="http://schemas.openxmlformats.org/drawingml/2006/main" xmlns:r="http://schemas.openxmlformats.org/officeDocument/2006/relationships" xmlns:p="http://schemas.openxmlformats.org/presentationml/2006/main">
+  <p:cSld>
+    <p:spTree>
+      <p:nvGrpSpPr>
+        <p:cNvPr id="1" name=""/>
+        <p:cNvGrpSpPr/>
+        <p:nvPr/>
+      </p:nvGrpSpPr>
+      <p:grpSpPr>
+        <a:xfrm>
+          <a:off x="0" y="0"/>
+          <a:ext cx="0" cy="0"/>
+          <a:chOff x="0" y="0"/>
+          <a:chExt cx="0" cy="0"/>
+        </a:xfrm>
+      </p:grpSpPr>
+      <p:sp>
+        <p:nvSpPr>
+          <p:cNvPr id="2" name="Title 1">
+            <a:extLst>
+              <a:ext uri="{FF2B5EF4-FFF2-40B4-BE49-F238E27FC236}">
+                <a16:creationId xmlns:a16="http://schemas.microsoft.com/office/drawing/2014/main" id="{6C574DBB-68DA-48AC-A3FB-1D20D02098A2}"/>
+              </a:ext>
+            </a:extLst>
+          </p:cNvPr>
+          <p:cNvSpPr>
+            <a:spLocks noGrp="1"/>
+          </p:cNvSpPr>
+          <p:nvPr>
+            <p:ph type="title"/>
+          </p:nvPr>
+        </p:nvSpPr>
+        <p:spPr/>
+        <p:txBody>
+          <a:bodyPr>
+            <a:normAutofit fontScale="90000"/>
+          </a:bodyPr>
+          <a:lstStyle/>
+          <a:p>
+            <a:r>
+              <a:rPr lang="en-US" dirty="0">
+                <a:solidFill>
+                  <a:schemeClr val="bg1"/>
+                </a:solidFill>
+              </a:rPr>
+              <a:t>Price and Volume comparison between 2010 and 2020</a:t>
+            </a:r>
+          </a:p>
+        </p:txBody>
+      </p:sp>
+      <p:sp>
+        <p:nvSpPr>
+          <p:cNvPr id="3" name="Text Placeholder 2">
+            <a:extLst>
+              <a:ext uri="{FF2B5EF4-FFF2-40B4-BE49-F238E27FC236}">
+                <a16:creationId xmlns:a16="http://schemas.microsoft.com/office/drawing/2014/main" id="{B77330C7-88B7-4302-BB08-E27AAA46038C}"/>
+              </a:ext>
+            </a:extLst>
+          </p:cNvPr>
+          <p:cNvSpPr>
+            <a:spLocks noGrp="1"/>
+          </p:cNvSpPr>
+          <p:nvPr>
+            <p:ph type="body" idx="1"/>
+          </p:nvPr>
+        </p:nvSpPr>
+        <p:spPr/>
+        <p:txBody>
+          <a:bodyPr/>
+          <a:lstStyle/>
+          <a:p>
+            <a:endParaRPr lang="en-US" dirty="0"/>
+          </a:p>
+        </p:txBody>
+      </p:sp>
+      <p:sp>
+        <p:nvSpPr>
+          <p:cNvPr id="4" name="Text Placeholder 3">
+            <a:extLst>
+              <a:ext uri="{FF2B5EF4-FFF2-40B4-BE49-F238E27FC236}">
+                <a16:creationId xmlns:a16="http://schemas.microsoft.com/office/drawing/2014/main" id="{1F3DC947-E950-4FD4-A7BC-CF905615FBD8}"/>
+              </a:ext>
+            </a:extLst>
+          </p:cNvPr>
+          <p:cNvSpPr>
+            <a:spLocks noGrp="1"/>
+          </p:cNvSpPr>
+          <p:nvPr>
+            <p:ph type="body" idx="2"/>
+          </p:nvPr>
+        </p:nvSpPr>
+        <p:spPr/>
+        <p:txBody>
+          <a:bodyPr/>
+          <a:lstStyle/>
+          <a:p>
+            <a:endParaRPr lang="en-US" dirty="0"/>
+          </a:p>
+        </p:txBody>
+      </p:sp>
+      <p:pic>
+        <p:nvPicPr>
+          <p:cNvPr id="6" name="Picture 5" descr="Graphical user interface, chart&#10;&#10;Description automatically generated">
+            <a:extLst>
+              <a:ext uri="{FF2B5EF4-FFF2-40B4-BE49-F238E27FC236}">
+                <a16:creationId xmlns:a16="http://schemas.microsoft.com/office/drawing/2014/main" id="{59B8A21A-C2C4-4362-83E8-5EBD512A2045}"/>
+              </a:ext>
+            </a:extLst>
+          </p:cNvPr>
+          <p:cNvPicPr>
+            <a:picLocks noChangeAspect="1"/>
+          </p:cNvPicPr>
+          <p:nvPr/>
+        </p:nvPicPr>
+        <p:blipFill>
+          <a:blip r:embed="rId2"/>
+          <a:stretch>
+            <a:fillRect/>
+          </a:stretch>
+        </p:blipFill>
+        <p:spPr>
+          <a:xfrm>
+            <a:off x="1" y="1229974"/>
+            <a:ext cx="4311600" cy="3913525"/>
+          </a:xfrm>
+          <a:prstGeom prst="rect">
+            <a:avLst/>
+          </a:prstGeom>
+        </p:spPr>
+      </p:pic>
+      <p:pic>
+        <p:nvPicPr>
+          <p:cNvPr id="8" name="Picture 7" descr="Chart&#10;&#10;Description automatically generated">
+            <a:extLst>
+              <a:ext uri="{FF2B5EF4-FFF2-40B4-BE49-F238E27FC236}">
+                <a16:creationId xmlns:a16="http://schemas.microsoft.com/office/drawing/2014/main" id="{21058919-5C3F-4F43-9A76-B4DED4C7A210}"/>
+              </a:ext>
+            </a:extLst>
+          </p:cNvPr>
+          <p:cNvPicPr>
+            <a:picLocks noChangeAspect="1"/>
+          </p:cNvPicPr>
+          <p:nvPr/>
+        </p:nvPicPr>
+        <p:blipFill>
+          <a:blip r:embed="rId3"/>
+          <a:stretch>
+            <a:fillRect/>
+          </a:stretch>
+        </p:blipFill>
+        <p:spPr>
+          <a:xfrm>
+            <a:off x="4832398" y="1229974"/>
+            <a:ext cx="3993525" cy="3913526"/>
+          </a:xfrm>
+          <a:prstGeom prst="rect">
+            <a:avLst/>
+          </a:prstGeom>
+        </p:spPr>
+      </p:pic>
+    </p:spTree>
+    <p:extLst>
+      <p:ext uri="{BB962C8B-B14F-4D97-AF65-F5344CB8AC3E}">
+        <p14:creationId xmlns:p14="http://schemas.microsoft.com/office/powerpoint/2010/main" val="3431727329"/>
+      </p:ext>
+    </p:extLst>
+  </p:cSld>
+  <p:clrMapOvr>
+    <a:masterClrMapping/>
+  </p:clrMapOvr>
+</p:sld>
+</file>
+
+<file path=ppt/slides/slide25.xml><?xml version="1.0" encoding="utf-8"?>
 <p:sld xmlns:a="http://schemas.openxmlformats.org/drawingml/2006/main" xmlns:r="http://schemas.openxmlformats.org/officeDocument/2006/relationships" xmlns:p="http://schemas.openxmlformats.org/presentationml/2006/main">
   <p:cSld>
     <p:spTree>
@@ -14194,7 +14726,7 @@
 </p:sld>
 </file>
 
-<file path=ppt/slides/slide23.xml><?xml version="1.0" encoding="utf-8"?>
+<file path=ppt/slides/slide26.xml><?xml version="1.0" encoding="utf-8"?>
 <p:sld xmlns:a="http://schemas.openxmlformats.org/drawingml/2006/main" xmlns:r="http://schemas.openxmlformats.org/officeDocument/2006/relationships" xmlns:p="http://schemas.openxmlformats.org/presentationml/2006/main">
   <p:cSld>
     <p:spTree>
@@ -14379,7 +14911,7 @@
 </p:sld>
 </file>
 
-<file path=ppt/slides/slide24.xml><?xml version="1.0" encoding="utf-8"?>
+<file path=ppt/slides/slide27.xml><?xml version="1.0" encoding="utf-8"?>
 <p:sld xmlns:a="http://schemas.openxmlformats.org/drawingml/2006/main" xmlns:r="http://schemas.openxmlformats.org/officeDocument/2006/relationships" xmlns:p="http://schemas.openxmlformats.org/presentationml/2006/main">
   <p:cSld>
     <p:spTree>

</xml_diff>